<commit_message>
Update coverslide and export as PDF
</commit_message>
<xml_diff>
--- a/coverslide.pptx
+++ b/coverslide.pptx
@@ -3000,7 +3000,7 @@
         </p:nvSpPr>
         <p:spPr>
           <a:xfrm>
-            <a:off x="217064" y="6039767"/>
+            <a:off x="217064" y="5860387"/>
             <a:ext cx="3454167" cy="506979"/>
           </a:xfrm>
         </p:spPr>
@@ -3035,8 +3035,8 @@
         </p:nvSpPr>
         <p:spPr>
           <a:xfrm>
-            <a:off x="83891" y="4735542"/>
-            <a:ext cx="3770852" cy="646331"/>
+            <a:off x="1317571" y="4724327"/>
+            <a:ext cx="2456834" cy="584775"/>
           </a:xfrm>
           <a:prstGeom prst="rect">
             <a:avLst/>
@@ -3050,7 +3050,7 @@
           <a:p>
             <a:pPr algn="r"/>
             <a:r>
-              <a:rPr lang="en-ZA" dirty="0">
+              <a:rPr lang="en-ZA" sz="1600" dirty="0">
                 <a:solidFill>
                   <a:schemeClr val="accent3">
                     <a:lumMod val="75000"/>
@@ -3059,7 +3059,22 @@
                 <a:latin typeface="Helvetica" panose="020B0604020202020204" pitchFamily="34" charset="0"/>
                 <a:cs typeface="Helvetica" panose="020B0604020202020204" pitchFamily="34" charset="0"/>
               </a:rPr>
-              <a:t>Teaching Biodiversity Short Course for FET Life Sciences Teachers</a:t>
+              <a:t>Teaching Biodiversity for</a:t>
+            </a:r>
+          </a:p>
+          <a:p>
+            <a:pPr algn="r"/>
+            <a:r>
+              <a:rPr lang="en-ZA" sz="1600" dirty="0">
+                <a:solidFill>
+                  <a:schemeClr val="accent3">
+                    <a:lumMod val="75000"/>
+                  </a:schemeClr>
+                </a:solidFill>
+                <a:latin typeface="Helvetica" panose="020B0604020202020204" pitchFamily="34" charset="0"/>
+                <a:cs typeface="Helvetica" panose="020B0604020202020204" pitchFamily="34" charset="0"/>
+              </a:rPr>
+              <a:t>FET Life Sciences</a:t>
             </a:r>
           </a:p>
         </p:txBody>
@@ -3150,8 +3165,8 @@
         </p:nvSpPr>
         <p:spPr>
           <a:xfrm>
-            <a:off x="2251284" y="5827516"/>
-            <a:ext cx="4572000" cy="646331"/>
+            <a:off x="2251284" y="5728747"/>
+            <a:ext cx="4572000" cy="584775"/>
           </a:xfrm>
           <a:prstGeom prst="rect">
             <a:avLst/>
@@ -3165,7 +3180,7 @@
           <a:p>
             <a:pPr algn="r"/>
             <a:r>
-              <a:rPr lang="en-ZA" dirty="0">
+              <a:rPr lang="en-ZA" sz="1600" dirty="0">
                 <a:solidFill>
                   <a:schemeClr val="accent3">
                     <a:lumMod val="75000"/>
@@ -3180,7 +3195,7 @@
           <a:p>
             <a:pPr algn="r"/>
             <a:r>
-              <a:rPr lang="en-ZA" dirty="0">
+              <a:rPr lang="en-ZA" sz="1600" dirty="0">
                 <a:solidFill>
                   <a:schemeClr val="accent3">
                     <a:lumMod val="75000"/>
@@ -3248,7 +3263,7 @@
         </p:nvSpPr>
         <p:spPr>
           <a:xfrm>
-            <a:off x="217064" y="855334"/>
+            <a:off x="217065" y="571133"/>
             <a:ext cx="3637677" cy="2154265"/>
           </a:xfrm>
         </p:spPr>
@@ -3383,7 +3398,7 @@
         </p:nvGrpSpPr>
         <p:grpSpPr>
           <a:xfrm>
-            <a:off x="390187" y="2972607"/>
+            <a:off x="399269" y="2905400"/>
             <a:ext cx="2868083" cy="1477126"/>
             <a:chOff x="985609" y="3418689"/>
             <a:chExt cx="2868083" cy="1477126"/>

</xml_diff>

<commit_message>
Add missing comma to coverslide
</commit_message>
<xml_diff>
--- a/coverslide.pptx
+++ b/coverslide.pptx
@@ -254,7 +254,7 @@
           <a:p>
             <a:fld id="{9C7D912C-B34B-4472-A454-60F445FFC2B6}" type="datetimeFigureOut">
               <a:rPr lang="en-ZA" smtClean="0"/>
-              <a:t>2019/03/13</a:t>
+              <a:t>2019/03/15</a:t>
             </a:fld>
             <a:endParaRPr lang="en-ZA"/>
           </a:p>
@@ -424,7 +424,7 @@
           <a:p>
             <a:fld id="{9C7D912C-B34B-4472-A454-60F445FFC2B6}" type="datetimeFigureOut">
               <a:rPr lang="en-ZA" smtClean="0"/>
-              <a:t>2019/03/13</a:t>
+              <a:t>2019/03/15</a:t>
             </a:fld>
             <a:endParaRPr lang="en-ZA"/>
           </a:p>
@@ -604,7 +604,7 @@
           <a:p>
             <a:fld id="{9C7D912C-B34B-4472-A454-60F445FFC2B6}" type="datetimeFigureOut">
               <a:rPr lang="en-ZA" smtClean="0"/>
-              <a:t>2019/03/13</a:t>
+              <a:t>2019/03/15</a:t>
             </a:fld>
             <a:endParaRPr lang="en-ZA"/>
           </a:p>
@@ -774,7 +774,7 @@
           <a:p>
             <a:fld id="{9C7D912C-B34B-4472-A454-60F445FFC2B6}" type="datetimeFigureOut">
               <a:rPr lang="en-ZA" smtClean="0"/>
-              <a:t>2019/03/13</a:t>
+              <a:t>2019/03/15</a:t>
             </a:fld>
             <a:endParaRPr lang="en-ZA"/>
           </a:p>
@@ -1018,7 +1018,7 @@
           <a:p>
             <a:fld id="{9C7D912C-B34B-4472-A454-60F445FFC2B6}" type="datetimeFigureOut">
               <a:rPr lang="en-ZA" smtClean="0"/>
-              <a:t>2019/03/13</a:t>
+              <a:t>2019/03/15</a:t>
             </a:fld>
             <a:endParaRPr lang="en-ZA"/>
           </a:p>
@@ -1250,7 +1250,7 @@
           <a:p>
             <a:fld id="{9C7D912C-B34B-4472-A454-60F445FFC2B6}" type="datetimeFigureOut">
               <a:rPr lang="en-ZA" smtClean="0"/>
-              <a:t>2019/03/13</a:t>
+              <a:t>2019/03/15</a:t>
             </a:fld>
             <a:endParaRPr lang="en-ZA"/>
           </a:p>
@@ -1617,7 +1617,7 @@
           <a:p>
             <a:fld id="{9C7D912C-B34B-4472-A454-60F445FFC2B6}" type="datetimeFigureOut">
               <a:rPr lang="en-ZA" smtClean="0"/>
-              <a:t>2019/03/13</a:t>
+              <a:t>2019/03/15</a:t>
             </a:fld>
             <a:endParaRPr lang="en-ZA"/>
           </a:p>
@@ -1735,7 +1735,7 @@
           <a:p>
             <a:fld id="{9C7D912C-B34B-4472-A454-60F445FFC2B6}" type="datetimeFigureOut">
               <a:rPr lang="en-ZA" smtClean="0"/>
-              <a:t>2019/03/13</a:t>
+              <a:t>2019/03/15</a:t>
             </a:fld>
             <a:endParaRPr lang="en-ZA"/>
           </a:p>
@@ -1830,7 +1830,7 @@
           <a:p>
             <a:fld id="{9C7D912C-B34B-4472-A454-60F445FFC2B6}" type="datetimeFigureOut">
               <a:rPr lang="en-ZA" smtClean="0"/>
-              <a:t>2019/03/13</a:t>
+              <a:t>2019/03/15</a:t>
             </a:fld>
             <a:endParaRPr lang="en-ZA"/>
           </a:p>
@@ -2107,7 +2107,7 @@
           <a:p>
             <a:fld id="{9C7D912C-B34B-4472-A454-60F445FFC2B6}" type="datetimeFigureOut">
               <a:rPr lang="en-ZA" smtClean="0"/>
-              <a:t>2019/03/13</a:t>
+              <a:t>2019/03/15</a:t>
             </a:fld>
             <a:endParaRPr lang="en-ZA"/>
           </a:p>
@@ -2364,7 +2364,7 @@
           <a:p>
             <a:fld id="{9C7D912C-B34B-4472-A454-60F445FFC2B6}" type="datetimeFigureOut">
               <a:rPr lang="en-ZA" smtClean="0"/>
-              <a:t>2019/03/13</a:t>
+              <a:t>2019/03/15</a:t>
             </a:fld>
             <a:endParaRPr lang="en-ZA"/>
           </a:p>
@@ -2577,7 +2577,7 @@
           <a:p>
             <a:fld id="{9C7D912C-B34B-4472-A454-60F445FFC2B6}" type="datetimeFigureOut">
               <a:rPr lang="en-ZA" smtClean="0"/>
-              <a:t>2019/03/13</a:t>
+              <a:t>2019/03/15</a:t>
             </a:fld>
             <a:endParaRPr lang="en-ZA"/>
           </a:p>
@@ -3279,7 +3279,7 @@
                 <a:latin typeface="Helvetica" panose="020B0604020202020204" pitchFamily="34" charset="0"/>
                 <a:cs typeface="Helvetica" panose="020B0604020202020204" pitchFamily="34" charset="0"/>
               </a:rPr>
-              <a:t>Biodiversity</a:t>
+              <a:t>Biodiversity,</a:t>
             </a:r>
             <a:br>
               <a:rPr lang="en-ZA" sz="4800" dirty="0">

</xml_diff>